<commit_message>
Couple more small updates to main
</commit_message>
<xml_diff>
--- a/Sprint Review PPT.pptx
+++ b/Sprint Review PPT.pptx
@@ -10609,417 +10609,541 @@
           </a:p>
         </p:txBody>
       </p:sp>
-      <p:pic>
-        <p:nvPicPr>
-          <p:cNvPr id="7" name="Picture 6">
+      <p:grpSp>
+        <p:nvGrpSpPr>
+          <p:cNvPr id="26" name="Group 25">
             <a:extLst>
               <a:ext uri="{FF2B5EF4-FFF2-40B4-BE49-F238E27FC236}">
-                <a16:creationId xmlns:a16="http://schemas.microsoft.com/office/drawing/2014/main" id="{0E09BC20-B082-45DC-8BAD-265A73E595C3}"/>
+                <a16:creationId xmlns:a16="http://schemas.microsoft.com/office/drawing/2014/main" id="{C68F1E91-2F35-44F4-A0BC-3C68E0FAA379}"/>
               </a:ext>
             </a:extLst>
           </p:cNvPr>
-          <p:cNvPicPr>
-            <a:picLocks noChangeAspect="1"/>
-          </p:cNvPicPr>
+          <p:cNvGrpSpPr/>
           <p:nvPr/>
-        </p:nvPicPr>
-        <p:blipFill>
-          <a:blip r:embed="rId2"/>
-          <a:stretch>
-            <a:fillRect/>
-          </a:stretch>
-        </p:blipFill>
-        <p:spPr>
-          <a:xfrm>
-            <a:off x="4227040" y="3858950"/>
-            <a:ext cx="3657600" cy="2451580"/>
-          </a:xfrm>
-          <a:prstGeom prst="rect">
-            <a:avLst/>
-          </a:prstGeom>
-        </p:spPr>
-      </p:pic>
-      <p:pic>
-        <p:nvPicPr>
-          <p:cNvPr id="9" name="Picture 8">
+        </p:nvGrpSpPr>
+        <p:grpSpPr>
+          <a:xfrm>
+            <a:off x="1941841" y="1165611"/>
+            <a:ext cx="3620500" cy="2715375"/>
+            <a:chOff x="2354905" y="1165611"/>
+            <a:chExt cx="3620500" cy="2715375"/>
+          </a:xfrm>
+        </p:grpSpPr>
+        <p:pic>
+          <p:nvPicPr>
+            <p:cNvPr id="8" name="Picture 7">
+              <a:extLst>
+                <a:ext uri="{FF2B5EF4-FFF2-40B4-BE49-F238E27FC236}">
+                  <a16:creationId xmlns:a16="http://schemas.microsoft.com/office/drawing/2014/main" id="{E5DE8E4B-1111-4E78-B43F-94E5F1FA4C7F}"/>
+                </a:ext>
+              </a:extLst>
+            </p:cNvPr>
+            <p:cNvPicPr>
+              <a:picLocks noChangeAspect="1"/>
+            </p:cNvPicPr>
+            <p:nvPr/>
+          </p:nvPicPr>
+          <p:blipFill>
+            <a:blip r:embed="rId2">
+              <a:extLst>
+                <a:ext uri="{28A0092B-C50C-407E-A947-70E740481C1C}">
+                  <a14:useLocalDpi xmlns:a14="http://schemas.microsoft.com/office/drawing/2010/main" val="0"/>
+                </a:ext>
+              </a:extLst>
+            </a:blip>
+            <a:stretch>
+              <a:fillRect/>
+            </a:stretch>
+          </p:blipFill>
+          <p:spPr>
+            <a:xfrm>
+              <a:off x="2354905" y="1165611"/>
+              <a:ext cx="3620500" cy="2715375"/>
+            </a:xfrm>
+            <a:prstGeom prst="rect">
+              <a:avLst/>
+            </a:prstGeom>
+          </p:spPr>
+        </p:pic>
+        <p:sp>
+          <p:nvSpPr>
+            <p:cNvPr id="17" name="TextBox 16">
+              <a:extLst>
+                <a:ext uri="{FF2B5EF4-FFF2-40B4-BE49-F238E27FC236}">
+                  <a16:creationId xmlns:a16="http://schemas.microsoft.com/office/drawing/2014/main" id="{66C7559F-196D-4FD4-A2D0-45B0C6D22F5F}"/>
+                </a:ext>
+              </a:extLst>
+            </p:cNvPr>
+            <p:cNvSpPr txBox="1"/>
+            <p:nvPr/>
+          </p:nvSpPr>
+          <p:spPr>
+            <a:xfrm>
+              <a:off x="3521559" y="2249367"/>
+              <a:ext cx="1410961" cy="553998"/>
+            </a:xfrm>
+            <a:prstGeom prst="rect">
+              <a:avLst/>
+            </a:prstGeom>
+            <a:noFill/>
+          </p:spPr>
+          <p:txBody>
+            <a:bodyPr wrap="square" lIns="0" tIns="0" rIns="0" bIns="0" rtlCol="0">
+              <a:spAutoFit/>
+            </a:bodyPr>
+            <a:lstStyle/>
+            <a:p>
+              <a:r>
+                <a:rPr lang="en-US" i="1" dirty="0">
+                  <a:solidFill>
+                    <a:schemeClr val="accent2"/>
+                  </a:solidFill>
+                </a:rPr>
+                <a:t>N = 20 points</a:t>
+              </a:r>
+            </a:p>
+            <a:p>
+              <a:pPr algn="ctr"/>
+              <a:r>
+                <a:rPr lang="en-US" i="1" dirty="0">
+                  <a:solidFill>
+                    <a:schemeClr val="accent2"/>
+                  </a:solidFill>
+                </a:rPr>
+                <a:t>Eq. spacing</a:t>
+              </a:r>
+            </a:p>
+          </p:txBody>
+        </p:sp>
+      </p:grpSp>
+      <p:grpSp>
+        <p:nvGrpSpPr>
+          <p:cNvPr id="27" name="Group 26">
             <a:extLst>
               <a:ext uri="{FF2B5EF4-FFF2-40B4-BE49-F238E27FC236}">
-                <a16:creationId xmlns:a16="http://schemas.microsoft.com/office/drawing/2014/main" id="{2366CAD9-04E2-467E-A177-4B840A5B365C}"/>
+                <a16:creationId xmlns:a16="http://schemas.microsoft.com/office/drawing/2014/main" id="{E39334E8-D940-464C-A993-298FBA057D04}"/>
               </a:ext>
             </a:extLst>
           </p:cNvPr>
-          <p:cNvPicPr>
-            <a:picLocks noChangeAspect="1"/>
-          </p:cNvPicPr>
+          <p:cNvGrpSpPr/>
           <p:nvPr/>
-        </p:nvPicPr>
-        <p:blipFill>
-          <a:blip r:embed="rId3"/>
-          <a:stretch>
-            <a:fillRect/>
-          </a:stretch>
-        </p:blipFill>
-        <p:spPr>
-          <a:xfrm>
-            <a:off x="207955" y="3858950"/>
-            <a:ext cx="3657600" cy="2451580"/>
-          </a:xfrm>
-          <a:prstGeom prst="rect">
-            <a:avLst/>
-          </a:prstGeom>
-        </p:spPr>
-      </p:pic>
-      <p:pic>
-        <p:nvPicPr>
-          <p:cNvPr id="11" name="Picture 10">
+        </p:nvGrpSpPr>
+        <p:grpSpPr>
+          <a:xfrm>
+            <a:off x="6629135" y="1165611"/>
+            <a:ext cx="3621024" cy="2715768"/>
+            <a:chOff x="7042199" y="1165611"/>
+            <a:chExt cx="3621024" cy="2715768"/>
+          </a:xfrm>
+        </p:grpSpPr>
+        <p:pic>
+          <p:nvPicPr>
+            <p:cNvPr id="12" name="Picture 11">
+              <a:extLst>
+                <a:ext uri="{FF2B5EF4-FFF2-40B4-BE49-F238E27FC236}">
+                  <a16:creationId xmlns:a16="http://schemas.microsoft.com/office/drawing/2014/main" id="{0D7C4D04-6477-4E96-BD5B-5B4EE973A610}"/>
+                </a:ext>
+              </a:extLst>
+            </p:cNvPr>
+            <p:cNvPicPr>
+              <a:picLocks noChangeAspect="1"/>
+            </p:cNvPicPr>
+            <p:nvPr/>
+          </p:nvPicPr>
+          <p:blipFill>
+            <a:blip r:embed="rId3">
+              <a:extLst>
+                <a:ext uri="{28A0092B-C50C-407E-A947-70E740481C1C}">
+                  <a14:useLocalDpi xmlns:a14="http://schemas.microsoft.com/office/drawing/2010/main" val="0"/>
+                </a:ext>
+              </a:extLst>
+            </a:blip>
+            <a:stretch>
+              <a:fillRect/>
+            </a:stretch>
+          </p:blipFill>
+          <p:spPr>
+            <a:xfrm>
+              <a:off x="7042199" y="1165611"/>
+              <a:ext cx="3621024" cy="2715768"/>
+            </a:xfrm>
+            <a:prstGeom prst="rect">
+              <a:avLst/>
+            </a:prstGeom>
+          </p:spPr>
+        </p:pic>
+        <p:sp>
+          <p:nvSpPr>
+            <p:cNvPr id="18" name="TextBox 17">
+              <a:extLst>
+                <a:ext uri="{FF2B5EF4-FFF2-40B4-BE49-F238E27FC236}">
+                  <a16:creationId xmlns:a16="http://schemas.microsoft.com/office/drawing/2014/main" id="{55146BF3-9B7A-4E00-AFDB-386BA17E0FD7}"/>
+                </a:ext>
+              </a:extLst>
+            </p:cNvPr>
+            <p:cNvSpPr txBox="1"/>
+            <p:nvPr/>
+          </p:nvSpPr>
+          <p:spPr>
+            <a:xfrm>
+              <a:off x="8082835" y="2246300"/>
+              <a:ext cx="1671777" cy="553998"/>
+            </a:xfrm>
+            <a:prstGeom prst="rect">
+              <a:avLst/>
+            </a:prstGeom>
+            <a:noFill/>
+          </p:spPr>
+          <p:txBody>
+            <a:bodyPr wrap="square" lIns="0" tIns="0" rIns="0" bIns="0" rtlCol="0">
+              <a:spAutoFit/>
+            </a:bodyPr>
+            <a:lstStyle/>
+            <a:p>
+              <a:r>
+                <a:rPr lang="en-US" i="1" dirty="0">
+                  <a:solidFill>
+                    <a:schemeClr val="accent2"/>
+                  </a:solidFill>
+                </a:rPr>
+                <a:t>N = 20 points</a:t>
+              </a:r>
+            </a:p>
+            <a:p>
+              <a:pPr algn="ctr"/>
+              <a:r>
+                <a:rPr lang="en-US" i="1" dirty="0">
+                  <a:solidFill>
+                    <a:schemeClr val="accent2"/>
+                  </a:solidFill>
+                </a:rPr>
+                <a:t>Random spacing</a:t>
+              </a:r>
+            </a:p>
+          </p:txBody>
+        </p:sp>
+      </p:grpSp>
+      <p:grpSp>
+        <p:nvGrpSpPr>
+          <p:cNvPr id="29" name="Group 28">
             <a:extLst>
               <a:ext uri="{FF2B5EF4-FFF2-40B4-BE49-F238E27FC236}">
-                <a16:creationId xmlns:a16="http://schemas.microsoft.com/office/drawing/2014/main" id="{26C93002-B5A6-45D6-AB45-291C3DFDF49C}"/>
+                <a16:creationId xmlns:a16="http://schemas.microsoft.com/office/drawing/2014/main" id="{1ADF9702-AE21-4923-B9CB-EF536A81696E}"/>
               </a:ext>
             </a:extLst>
           </p:cNvPr>
-          <p:cNvPicPr>
-            <a:picLocks noChangeAspect="1"/>
-          </p:cNvPicPr>
+          <p:cNvGrpSpPr/>
           <p:nvPr/>
-        </p:nvPicPr>
-        <p:blipFill>
-          <a:blip r:embed="rId4"/>
-          <a:stretch>
-            <a:fillRect/>
-          </a:stretch>
-        </p:blipFill>
-        <p:spPr>
-          <a:xfrm>
-            <a:off x="8149236" y="3858950"/>
-            <a:ext cx="3657600" cy="2451580"/>
-          </a:xfrm>
-          <a:prstGeom prst="rect">
-            <a:avLst/>
-          </a:prstGeom>
-        </p:spPr>
-      </p:pic>
-      <p:pic>
-        <p:nvPicPr>
-          <p:cNvPr id="13" name="Picture 12">
+        </p:nvGrpSpPr>
+        <p:grpSpPr>
+          <a:xfrm>
+            <a:off x="246437" y="3655958"/>
+            <a:ext cx="3621024" cy="2715768"/>
+            <a:chOff x="232330" y="3655958"/>
+            <a:chExt cx="3621024" cy="2715768"/>
+          </a:xfrm>
+        </p:grpSpPr>
+        <p:pic>
+          <p:nvPicPr>
+            <p:cNvPr id="23" name="Picture 22">
+              <a:extLst>
+                <a:ext uri="{FF2B5EF4-FFF2-40B4-BE49-F238E27FC236}">
+                  <a16:creationId xmlns:a16="http://schemas.microsoft.com/office/drawing/2014/main" id="{E3238632-A2FF-4D00-B9C1-DBFAB0ACE50C}"/>
+                </a:ext>
+              </a:extLst>
+            </p:cNvPr>
+            <p:cNvPicPr>
+              <a:picLocks noChangeAspect="1"/>
+            </p:cNvPicPr>
+            <p:nvPr/>
+          </p:nvPicPr>
+          <p:blipFill>
+            <a:blip r:embed="rId4">
+              <a:extLst>
+                <a:ext uri="{28A0092B-C50C-407E-A947-70E740481C1C}">
+                  <a14:useLocalDpi xmlns:a14="http://schemas.microsoft.com/office/drawing/2010/main" val="0"/>
+                </a:ext>
+              </a:extLst>
+            </a:blip>
+            <a:stretch>
+              <a:fillRect/>
+            </a:stretch>
+          </p:blipFill>
+          <p:spPr>
+            <a:xfrm>
+              <a:off x="232330" y="3655958"/>
+              <a:ext cx="3621024" cy="2715768"/>
+            </a:xfrm>
+            <a:prstGeom prst="rect">
+              <a:avLst/>
+            </a:prstGeom>
+          </p:spPr>
+        </p:pic>
+        <p:sp>
+          <p:nvSpPr>
+            <p:cNvPr id="19" name="TextBox 18">
+              <a:extLst>
+                <a:ext uri="{FF2B5EF4-FFF2-40B4-BE49-F238E27FC236}">
+                  <a16:creationId xmlns:a16="http://schemas.microsoft.com/office/drawing/2014/main" id="{1779A3FA-9F9F-4D20-9EDB-439D9EBBB03B}"/>
+                </a:ext>
+              </a:extLst>
+            </p:cNvPr>
+            <p:cNvSpPr txBox="1"/>
+            <p:nvPr/>
+          </p:nvSpPr>
+          <p:spPr>
+            <a:xfrm>
+              <a:off x="1345523" y="4742228"/>
+              <a:ext cx="1671777" cy="553998"/>
+            </a:xfrm>
+            <a:prstGeom prst="rect">
+              <a:avLst/>
+            </a:prstGeom>
+            <a:noFill/>
+          </p:spPr>
+          <p:txBody>
+            <a:bodyPr wrap="square" lIns="0" tIns="0" rIns="0" bIns="0" rtlCol="0">
+              <a:spAutoFit/>
+            </a:bodyPr>
+            <a:lstStyle/>
+            <a:p>
+              <a:r>
+                <a:rPr lang="en-US" i="1" dirty="0">
+                  <a:solidFill>
+                    <a:schemeClr val="accent2"/>
+                  </a:solidFill>
+                </a:rPr>
+                <a:t>N = 100 points</a:t>
+              </a:r>
+            </a:p>
+            <a:p>
+              <a:pPr algn="ctr"/>
+              <a:r>
+                <a:rPr lang="en-US" i="1" dirty="0">
+                  <a:solidFill>
+                    <a:schemeClr val="accent2"/>
+                  </a:solidFill>
+                </a:rPr>
+                <a:t>Eq. spacing</a:t>
+              </a:r>
+            </a:p>
+          </p:txBody>
+        </p:sp>
+      </p:grpSp>
+      <p:grpSp>
+        <p:nvGrpSpPr>
+          <p:cNvPr id="28" name="Group 27">
             <a:extLst>
               <a:ext uri="{FF2B5EF4-FFF2-40B4-BE49-F238E27FC236}">
-                <a16:creationId xmlns:a16="http://schemas.microsoft.com/office/drawing/2014/main" id="{A9FC15EB-C14C-4DF0-A296-98935890E5FA}"/>
+                <a16:creationId xmlns:a16="http://schemas.microsoft.com/office/drawing/2014/main" id="{6650B356-A0DA-4E32-A1A5-5025E618C9B2}"/>
               </a:ext>
             </a:extLst>
           </p:cNvPr>
-          <p:cNvPicPr>
-            <a:picLocks noChangeAspect="1"/>
-          </p:cNvPicPr>
+          <p:cNvGrpSpPr/>
           <p:nvPr/>
-        </p:nvPicPr>
-        <p:blipFill>
-          <a:blip r:embed="rId5">
-            <a:clrChange>
-              <a:clrFrom>
-                <a:srgbClr val="FFFFFF"/>
-              </a:clrFrom>
-              <a:clrTo>
-                <a:srgbClr val="FFFFFF">
-                  <a:alpha val="0"/>
-                </a:srgbClr>
-              </a:clrTo>
-            </a:clrChange>
-          </a:blip>
-          <a:stretch>
-            <a:fillRect/>
-          </a:stretch>
-        </p:blipFill>
-        <p:spPr>
-          <a:xfrm>
-            <a:off x="2181412" y="1323880"/>
-            <a:ext cx="3657600" cy="2451580"/>
-          </a:xfrm>
-          <a:prstGeom prst="rect">
-            <a:avLst/>
-          </a:prstGeom>
-        </p:spPr>
-      </p:pic>
-      <p:pic>
-        <p:nvPicPr>
-          <p:cNvPr id="15" name="Picture 14">
+        </p:nvGrpSpPr>
+        <p:grpSpPr>
+          <a:xfrm>
+            <a:off x="4285488" y="3655958"/>
+            <a:ext cx="3621024" cy="2715768"/>
+            <a:chOff x="4315968" y="3655958"/>
+            <a:chExt cx="3621024" cy="2715768"/>
+          </a:xfrm>
+        </p:grpSpPr>
+        <p:pic>
+          <p:nvPicPr>
+            <p:cNvPr id="25" name="Picture 24">
+              <a:extLst>
+                <a:ext uri="{FF2B5EF4-FFF2-40B4-BE49-F238E27FC236}">
+                  <a16:creationId xmlns:a16="http://schemas.microsoft.com/office/drawing/2014/main" id="{F7AE47D9-14E7-4769-9CB8-46200B4A2B27}"/>
+                </a:ext>
+              </a:extLst>
+            </p:cNvPr>
+            <p:cNvPicPr>
+              <a:picLocks noChangeAspect="1"/>
+            </p:cNvPicPr>
+            <p:nvPr/>
+          </p:nvPicPr>
+          <p:blipFill>
+            <a:blip r:embed="rId5">
+              <a:extLst>
+                <a:ext uri="{28A0092B-C50C-407E-A947-70E740481C1C}">
+                  <a14:useLocalDpi xmlns:a14="http://schemas.microsoft.com/office/drawing/2010/main" val="0"/>
+                </a:ext>
+              </a:extLst>
+            </a:blip>
+            <a:stretch>
+              <a:fillRect/>
+            </a:stretch>
+          </p:blipFill>
+          <p:spPr>
+            <a:xfrm>
+              <a:off x="4315968" y="3655958"/>
+              <a:ext cx="3621024" cy="2715768"/>
+            </a:xfrm>
+            <a:prstGeom prst="rect">
+              <a:avLst/>
+            </a:prstGeom>
+          </p:spPr>
+        </p:pic>
+        <p:sp>
+          <p:nvSpPr>
+            <p:cNvPr id="20" name="TextBox 19">
+              <a:extLst>
+                <a:ext uri="{FF2B5EF4-FFF2-40B4-BE49-F238E27FC236}">
+                  <a16:creationId xmlns:a16="http://schemas.microsoft.com/office/drawing/2014/main" id="{990D25C5-7504-49AC-9E22-BAD11633B1A6}"/>
+                </a:ext>
+              </a:extLst>
+            </p:cNvPr>
+            <p:cNvSpPr txBox="1"/>
+            <p:nvPr/>
+          </p:nvSpPr>
+          <p:spPr>
+            <a:xfrm>
+              <a:off x="5431687" y="4742228"/>
+              <a:ext cx="1671777" cy="553998"/>
+            </a:xfrm>
+            <a:prstGeom prst="rect">
+              <a:avLst/>
+            </a:prstGeom>
+            <a:noFill/>
+          </p:spPr>
+          <p:txBody>
+            <a:bodyPr wrap="square" lIns="0" tIns="0" rIns="0" bIns="0" rtlCol="0">
+              <a:spAutoFit/>
+            </a:bodyPr>
+            <a:lstStyle/>
+            <a:p>
+              <a:r>
+                <a:rPr lang="en-US" i="1" dirty="0">
+                  <a:solidFill>
+                    <a:schemeClr val="accent2"/>
+                  </a:solidFill>
+                </a:rPr>
+                <a:t>N = 1000 points</a:t>
+              </a:r>
+            </a:p>
+            <a:p>
+              <a:pPr algn="ctr"/>
+              <a:r>
+                <a:rPr lang="en-US" i="1" dirty="0">
+                  <a:solidFill>
+                    <a:schemeClr val="accent2"/>
+                  </a:solidFill>
+                </a:rPr>
+                <a:t>Eq. spacing</a:t>
+              </a:r>
+            </a:p>
+          </p:txBody>
+        </p:sp>
+      </p:grpSp>
+      <p:grpSp>
+        <p:nvGrpSpPr>
+          <p:cNvPr id="30" name="Group 29">
             <a:extLst>
               <a:ext uri="{FF2B5EF4-FFF2-40B4-BE49-F238E27FC236}">
-                <a16:creationId xmlns:a16="http://schemas.microsoft.com/office/drawing/2014/main" id="{423953B8-58A8-44C0-82BE-F67951547EC1}"/>
+                <a16:creationId xmlns:a16="http://schemas.microsoft.com/office/drawing/2014/main" id="{2A9737D4-BF89-4ACE-805D-29B033BEB491}"/>
               </a:ext>
             </a:extLst>
           </p:cNvPr>
-          <p:cNvPicPr>
-            <a:picLocks noChangeAspect="1"/>
-          </p:cNvPicPr>
+          <p:cNvGrpSpPr/>
           <p:nvPr/>
-        </p:nvPicPr>
-        <p:blipFill>
-          <a:blip r:embed="rId6"/>
-          <a:stretch>
-            <a:fillRect/>
-          </a:stretch>
-        </p:blipFill>
-        <p:spPr>
-          <a:xfrm>
-            <a:off x="6735247" y="1319345"/>
-            <a:ext cx="3657600" cy="2451580"/>
-          </a:xfrm>
-          <a:prstGeom prst="rect">
-            <a:avLst/>
-          </a:prstGeom>
-        </p:spPr>
-      </p:pic>
-      <p:sp>
-        <p:nvSpPr>
-          <p:cNvPr id="17" name="TextBox 16">
-            <a:extLst>
-              <a:ext uri="{FF2B5EF4-FFF2-40B4-BE49-F238E27FC236}">
-                <a16:creationId xmlns:a16="http://schemas.microsoft.com/office/drawing/2014/main" id="{66C7559F-196D-4FD4-A2D0-45B0C6D22F5F}"/>
-              </a:ext>
-            </a:extLst>
-          </p:cNvPr>
-          <p:cNvSpPr txBox="1"/>
-          <p:nvPr/>
-        </p:nvSpPr>
-        <p:spPr>
-          <a:xfrm>
-            <a:off x="3521559" y="2249367"/>
-            <a:ext cx="1410961" cy="553998"/>
-          </a:xfrm>
-          <a:prstGeom prst="rect">
-            <a:avLst/>
-          </a:prstGeom>
-          <a:noFill/>
-        </p:spPr>
-        <p:txBody>
-          <a:bodyPr wrap="square" lIns="0" tIns="0" rIns="0" bIns="0" rtlCol="0">
-            <a:spAutoFit/>
-          </a:bodyPr>
-          <a:lstStyle/>
-          <a:p>
-            <a:r>
-              <a:rPr lang="en-US" i="1" dirty="0">
-                <a:solidFill>
-                  <a:schemeClr val="accent2"/>
-                </a:solidFill>
-              </a:rPr>
-              <a:t>N = 20 points</a:t>
-            </a:r>
-          </a:p>
-          <a:p>
-            <a:pPr algn="ctr"/>
-            <a:r>
-              <a:rPr lang="en-US" i="1" dirty="0">
-                <a:solidFill>
-                  <a:schemeClr val="accent2"/>
-                </a:solidFill>
-              </a:rPr>
-              <a:t>Eq. spacing</a:t>
-            </a:r>
-          </a:p>
-        </p:txBody>
-      </p:sp>
-      <p:sp>
-        <p:nvSpPr>
-          <p:cNvPr id="18" name="TextBox 17">
-            <a:extLst>
-              <a:ext uri="{FF2B5EF4-FFF2-40B4-BE49-F238E27FC236}">
-                <a16:creationId xmlns:a16="http://schemas.microsoft.com/office/drawing/2014/main" id="{55146BF3-9B7A-4E00-AFDB-386BA17E0FD7}"/>
-              </a:ext>
-            </a:extLst>
-          </p:cNvPr>
-          <p:cNvSpPr txBox="1"/>
-          <p:nvPr/>
-        </p:nvSpPr>
-        <p:spPr>
-          <a:xfrm>
-            <a:off x="8082835" y="2246300"/>
-            <a:ext cx="1671777" cy="553998"/>
-          </a:xfrm>
-          <a:prstGeom prst="rect">
-            <a:avLst/>
-          </a:prstGeom>
-          <a:noFill/>
-        </p:spPr>
-        <p:txBody>
-          <a:bodyPr wrap="square" lIns="0" tIns="0" rIns="0" bIns="0" rtlCol="0">
-            <a:spAutoFit/>
-          </a:bodyPr>
-          <a:lstStyle/>
-          <a:p>
-            <a:r>
-              <a:rPr lang="en-US" i="1" dirty="0">
-                <a:solidFill>
-                  <a:schemeClr val="accent2"/>
-                </a:solidFill>
-              </a:rPr>
-              <a:t>N = 20 points</a:t>
-            </a:r>
-          </a:p>
-          <a:p>
-            <a:pPr algn="ctr"/>
-            <a:r>
-              <a:rPr lang="en-US" i="1" dirty="0">
-                <a:solidFill>
-                  <a:schemeClr val="accent2"/>
-                </a:solidFill>
-              </a:rPr>
-              <a:t>Random spacing</a:t>
-            </a:r>
-          </a:p>
-        </p:txBody>
-      </p:sp>
-      <p:sp>
-        <p:nvSpPr>
-          <p:cNvPr id="19" name="TextBox 18">
-            <a:extLst>
-              <a:ext uri="{FF2B5EF4-FFF2-40B4-BE49-F238E27FC236}">
-                <a16:creationId xmlns:a16="http://schemas.microsoft.com/office/drawing/2014/main" id="{1779A3FA-9F9F-4D20-9EDB-439D9EBBB03B}"/>
-              </a:ext>
-            </a:extLst>
-          </p:cNvPr>
-          <p:cNvSpPr txBox="1"/>
-          <p:nvPr/>
-        </p:nvSpPr>
-        <p:spPr>
-          <a:xfrm>
-            <a:off x="1345523" y="4742228"/>
-            <a:ext cx="1671777" cy="553998"/>
-          </a:xfrm>
-          <a:prstGeom prst="rect">
-            <a:avLst/>
-          </a:prstGeom>
-          <a:noFill/>
-        </p:spPr>
-        <p:txBody>
-          <a:bodyPr wrap="square" lIns="0" tIns="0" rIns="0" bIns="0" rtlCol="0">
-            <a:spAutoFit/>
-          </a:bodyPr>
-          <a:lstStyle/>
-          <a:p>
-            <a:r>
-              <a:rPr lang="en-US" i="1" dirty="0">
-                <a:solidFill>
-                  <a:schemeClr val="accent2"/>
-                </a:solidFill>
-              </a:rPr>
-              <a:t>N = 100 points</a:t>
-            </a:r>
-          </a:p>
-          <a:p>
-            <a:pPr algn="ctr"/>
-            <a:r>
-              <a:rPr lang="en-US" i="1" dirty="0">
-                <a:solidFill>
-                  <a:schemeClr val="accent2"/>
-                </a:solidFill>
-              </a:rPr>
-              <a:t>Eq. spacing</a:t>
-            </a:r>
-          </a:p>
-        </p:txBody>
-      </p:sp>
-      <p:sp>
-        <p:nvSpPr>
-          <p:cNvPr id="20" name="TextBox 19">
-            <a:extLst>
-              <a:ext uri="{FF2B5EF4-FFF2-40B4-BE49-F238E27FC236}">
-                <a16:creationId xmlns:a16="http://schemas.microsoft.com/office/drawing/2014/main" id="{990D25C5-7504-49AC-9E22-BAD11633B1A6}"/>
-              </a:ext>
-            </a:extLst>
-          </p:cNvPr>
-          <p:cNvSpPr txBox="1"/>
-          <p:nvPr/>
-        </p:nvSpPr>
-        <p:spPr>
-          <a:xfrm>
-            <a:off x="5431687" y="4742228"/>
-            <a:ext cx="1671777" cy="553998"/>
-          </a:xfrm>
-          <a:prstGeom prst="rect">
-            <a:avLst/>
-          </a:prstGeom>
-          <a:noFill/>
-        </p:spPr>
-        <p:txBody>
-          <a:bodyPr wrap="square" lIns="0" tIns="0" rIns="0" bIns="0" rtlCol="0">
-            <a:spAutoFit/>
-          </a:bodyPr>
-          <a:lstStyle/>
-          <a:p>
-            <a:r>
-              <a:rPr lang="en-US" i="1" dirty="0">
-                <a:solidFill>
-                  <a:schemeClr val="accent2"/>
-                </a:solidFill>
-              </a:rPr>
-              <a:t>N = 1000 points</a:t>
-            </a:r>
-          </a:p>
-          <a:p>
-            <a:pPr algn="ctr"/>
-            <a:r>
-              <a:rPr lang="en-US" i="1" dirty="0">
-                <a:solidFill>
-                  <a:schemeClr val="accent2"/>
-                </a:solidFill>
-              </a:rPr>
-              <a:t>Eq. spacing</a:t>
-            </a:r>
-          </a:p>
-        </p:txBody>
-      </p:sp>
-      <p:sp>
-        <p:nvSpPr>
-          <p:cNvPr id="21" name="TextBox 20">
-            <a:extLst>
-              <a:ext uri="{FF2B5EF4-FFF2-40B4-BE49-F238E27FC236}">
-                <a16:creationId xmlns:a16="http://schemas.microsoft.com/office/drawing/2014/main" id="{5C781B61-7EBE-4121-85EE-3FA310C04A5E}"/>
-              </a:ext>
-            </a:extLst>
-          </p:cNvPr>
-          <p:cNvSpPr txBox="1"/>
-          <p:nvPr/>
-        </p:nvSpPr>
-        <p:spPr>
-          <a:xfrm>
-            <a:off x="9399133" y="4736843"/>
-            <a:ext cx="1671777" cy="553998"/>
-          </a:xfrm>
-          <a:prstGeom prst="rect">
-            <a:avLst/>
-          </a:prstGeom>
-          <a:noFill/>
-        </p:spPr>
-        <p:txBody>
-          <a:bodyPr wrap="square" lIns="0" tIns="0" rIns="0" bIns="0" rtlCol="0">
-            <a:spAutoFit/>
-          </a:bodyPr>
-          <a:lstStyle/>
-          <a:p>
-            <a:r>
-              <a:rPr lang="en-US" i="1" dirty="0">
-                <a:solidFill>
-                  <a:schemeClr val="accent2"/>
-                </a:solidFill>
-              </a:rPr>
-              <a:t>N = 10000 points</a:t>
-            </a:r>
-          </a:p>
-          <a:p>
-            <a:pPr algn="ctr"/>
-            <a:r>
-              <a:rPr lang="en-US" i="1" dirty="0">
-                <a:solidFill>
-                  <a:schemeClr val="accent2"/>
-                </a:solidFill>
-              </a:rPr>
-              <a:t>Eq. spacing</a:t>
-            </a:r>
-          </a:p>
-        </p:txBody>
-      </p:sp>
+        </p:nvGrpSpPr>
+        <p:grpSpPr>
+          <a:xfrm>
+            <a:off x="8324539" y="3655958"/>
+            <a:ext cx="3621024" cy="2715768"/>
+            <a:chOff x="8310432" y="3655958"/>
+            <a:chExt cx="3621024" cy="2715768"/>
+          </a:xfrm>
+        </p:grpSpPr>
+        <p:pic>
+          <p:nvPicPr>
+            <p:cNvPr id="16" name="Picture 15">
+              <a:extLst>
+                <a:ext uri="{FF2B5EF4-FFF2-40B4-BE49-F238E27FC236}">
+                  <a16:creationId xmlns:a16="http://schemas.microsoft.com/office/drawing/2014/main" id="{656021F5-5A4A-45BB-B5A9-52C08B0D7B6E}"/>
+                </a:ext>
+              </a:extLst>
+            </p:cNvPr>
+            <p:cNvPicPr>
+              <a:picLocks noChangeAspect="1"/>
+            </p:cNvPicPr>
+            <p:nvPr/>
+          </p:nvPicPr>
+          <p:blipFill>
+            <a:blip r:embed="rId6">
+              <a:extLst>
+                <a:ext uri="{28A0092B-C50C-407E-A947-70E740481C1C}">
+                  <a14:useLocalDpi xmlns:a14="http://schemas.microsoft.com/office/drawing/2010/main" val="0"/>
+                </a:ext>
+              </a:extLst>
+            </a:blip>
+            <a:stretch>
+              <a:fillRect/>
+            </a:stretch>
+          </p:blipFill>
+          <p:spPr>
+            <a:xfrm>
+              <a:off x="8310432" y="3655958"/>
+              <a:ext cx="3621024" cy="2715768"/>
+            </a:xfrm>
+            <a:prstGeom prst="rect">
+              <a:avLst/>
+            </a:prstGeom>
+          </p:spPr>
+        </p:pic>
+        <p:sp>
+          <p:nvSpPr>
+            <p:cNvPr id="21" name="TextBox 20">
+              <a:extLst>
+                <a:ext uri="{FF2B5EF4-FFF2-40B4-BE49-F238E27FC236}">
+                  <a16:creationId xmlns:a16="http://schemas.microsoft.com/office/drawing/2014/main" id="{5C781B61-7EBE-4121-85EE-3FA310C04A5E}"/>
+                </a:ext>
+              </a:extLst>
+            </p:cNvPr>
+            <p:cNvSpPr txBox="1"/>
+            <p:nvPr/>
+          </p:nvSpPr>
+          <p:spPr>
+            <a:xfrm>
+              <a:off x="9399133" y="4736843"/>
+              <a:ext cx="1671777" cy="553998"/>
+            </a:xfrm>
+            <a:prstGeom prst="rect">
+              <a:avLst/>
+            </a:prstGeom>
+            <a:noFill/>
+          </p:spPr>
+          <p:txBody>
+            <a:bodyPr wrap="square" lIns="0" tIns="0" rIns="0" bIns="0" rtlCol="0">
+              <a:spAutoFit/>
+            </a:bodyPr>
+            <a:lstStyle/>
+            <a:p>
+              <a:r>
+                <a:rPr lang="en-US" i="1" dirty="0">
+                  <a:solidFill>
+                    <a:schemeClr val="accent2"/>
+                  </a:solidFill>
+                </a:rPr>
+                <a:t>N = 10000 points</a:t>
+              </a:r>
+            </a:p>
+            <a:p>
+              <a:pPr algn="ctr"/>
+              <a:r>
+                <a:rPr lang="en-US" i="1" dirty="0">
+                  <a:solidFill>
+                    <a:schemeClr val="accent2"/>
+                  </a:solidFill>
+                </a:rPr>
+                <a:t>Eq. spacing</a:t>
+              </a:r>
+            </a:p>
+          </p:txBody>
+        </p:sp>
+      </p:grpSp>
     </p:spTree>
     <p:extLst>
       <p:ext uri="{BB962C8B-B14F-4D97-AF65-F5344CB8AC3E}">

</xml_diff>